<commit_message>
Some changes in introduction
</commit_message>
<xml_diff>
--- a/Final Presentation/finalpresentation.pptx
+++ b/Final Presentation/finalpresentation.pptx
@@ -16,9 +16,9 @@
     <p:sldId id="282" r:id="rId4"/>
     <p:sldId id="283" r:id="rId5"/>
     <p:sldId id="284" r:id="rId6"/>
-    <p:sldId id="285" r:id="rId7"/>
-    <p:sldId id="286" r:id="rId8"/>
-    <p:sldId id="287" r:id="rId9"/>
+    <p:sldId id="287" r:id="rId7"/>
+    <p:sldId id="285" r:id="rId8"/>
+    <p:sldId id="286" r:id="rId9"/>
     <p:sldId id="288" r:id="rId10"/>
     <p:sldId id="289" r:id="rId11"/>
     <p:sldId id="290" r:id="rId12"/>
@@ -3544,7 +3544,7 @@
 </dgm:dataModel>
 </file>
 
-<file path=ppt/diagrams/data3.xml><?xml version="1.0" encoding="utf-8"?>
+<file path=ppt/diagrams/data2.xml><?xml version="1.0" encoding="utf-8"?>
 <dgm:dataModel xmlns:dgm="http://schemas.openxmlformats.org/drawingml/2006/diagram" xmlns:a="http://schemas.openxmlformats.org/drawingml/2006/main">
   <dgm:ptLst>
     <dgm:pt modelId="{7C237E65-05A9-4001-B427-7C810F88C8CF}" type="doc">
@@ -3902,7 +3902,7 @@
 </dgm:dataModel>
 </file>
 
-<file path=ppt/diagrams/data4.xml><?xml version="1.0" encoding="utf-8"?>
+<file path=ppt/diagrams/data3.xml><?xml version="1.0" encoding="utf-8"?>
 <dgm:dataModel xmlns:dgm="http://schemas.openxmlformats.org/drawingml/2006/diagram" xmlns:a="http://schemas.openxmlformats.org/drawingml/2006/main">
   <dgm:ptLst>
     <dgm:pt modelId="{7C237E65-05A9-4001-B427-7C810F88C8CF}" type="doc">
@@ -4256,7 +4256,7 @@
 </dgm:dataModel>
 </file>
 
-<file path=ppt/diagrams/data5.xml><?xml version="1.0" encoding="utf-8"?>
+<file path=ppt/diagrams/data4.xml><?xml version="1.0" encoding="utf-8"?>
 <dgm:dataModel xmlns:dgm="http://schemas.openxmlformats.org/drawingml/2006/diagram" xmlns:a="http://schemas.openxmlformats.org/drawingml/2006/main">
   <dgm:ptLst>
     <dgm:pt modelId="{7C237E65-05A9-4001-B427-7C810F88C8CF}" type="doc">
@@ -16631,7 +16631,7 @@
             <a:pPr rtl="0"/>
             <a:fld id="{339E3CEE-003F-4557-BFD6-4E60A64CE0D9}" type="datetime1">
               <a:rPr lang="it-IT" smtClean="0"/>
-              <a:t>16/12/2017</a:t>
+              <a:t>20/12/2017</a:t>
             </a:fld>
             <a:endParaRPr lang="it-IT" dirty="0"/>
           </a:p>
@@ -16801,7 +16801,7 @@
             <a:pPr rtl="0"/>
             <a:fld id="{60A4D80D-DBB0-4E80-B9E5-08E8F0900F92}" type="datetime1">
               <a:rPr lang="it-IT" smtClean="0"/>
-              <a:t>16/12/2017</a:t>
+              <a:t>20/12/2017</a:t>
             </a:fld>
             <a:endParaRPr lang="it-IT" dirty="0"/>
           </a:p>
@@ -17223,7 +17223,7 @@
             <a:pPr rtl="0"/>
             <a:fld id="{9555D449-B875-4B8D-8E66-224D27E54C9A}" type="slidenum">
               <a:rPr lang="it-IT" smtClean="0"/>
-              <a:t>8</a:t>
+              <a:t>6</a:t>
             </a:fld>
             <a:endParaRPr lang="it-IT" dirty="0"/>
           </a:p>
@@ -17755,7 +17755,7 @@
             <a:pPr rtl="0"/>
             <a:fld id="{0FDF443E-F33D-4C52-AF27-143A540EFAEF}" type="datetime1">
               <a:rPr lang="it-IT" smtClean="0"/>
-              <a:t>16/12/2017</a:t>
+              <a:t>20/12/2017</a:t>
             </a:fld>
             <a:endParaRPr lang="it-IT" dirty="0"/>
           </a:p>
@@ -18011,7 +18011,7 @@
             <a:pPr rtl="0"/>
             <a:fld id="{8E600AB7-B7BB-4AD9-8D6D-2F3EA9D6250F}" type="datetime1">
               <a:rPr lang="it-IT" smtClean="0"/>
-              <a:t>16/12/2017</a:t>
+              <a:t>20/12/2017</a:t>
             </a:fld>
             <a:endParaRPr lang="it-IT" dirty="0"/>
           </a:p>
@@ -18207,7 +18207,7 @@
             <a:pPr rtl="0"/>
             <a:fld id="{DC0286FE-E7A0-4482-B921-0187F966D274}" type="datetime1">
               <a:rPr lang="it-IT" smtClean="0"/>
-              <a:t>16/12/2017</a:t>
+              <a:t>20/12/2017</a:t>
             </a:fld>
             <a:endParaRPr lang="it-IT" dirty="0"/>
           </a:p>
@@ -18741,7 +18741,7 @@
             <a:pPr rtl="0"/>
             <a:fld id="{DC8C5675-8C9F-4604-B43A-016F0F3A6B92}" type="datetime1">
               <a:rPr lang="it-IT" smtClean="0"/>
-              <a:t>16/12/2017</a:t>
+              <a:t>20/12/2017</a:t>
             </a:fld>
             <a:endParaRPr lang="it-IT" dirty="0"/>
           </a:p>
@@ -19196,7 +19196,7 @@
             <a:pPr rtl="0"/>
             <a:fld id="{DBA18AA6-DAC6-4EE3-A4A8-F843A48529A6}" type="datetime1">
               <a:rPr lang="it-IT" smtClean="0"/>
-              <a:t>16/12/2017</a:t>
+              <a:t>20/12/2017</a:t>
             </a:fld>
             <a:endParaRPr lang="it-IT" dirty="0"/>
           </a:p>
@@ -19329,7 +19329,7 @@
             <a:pPr rtl="0"/>
             <a:fld id="{0A2ACC47-4924-461F-BA7E-81BD87D8769E}" type="datetime1">
               <a:rPr lang="it-IT" smtClean="0"/>
-              <a:t>16/12/2017</a:t>
+              <a:t>20/12/2017</a:t>
             </a:fld>
             <a:endParaRPr lang="it-IT" dirty="0"/>
           </a:p>
@@ -19439,7 +19439,7 @@
             <a:pPr rtl="0"/>
             <a:fld id="{69533BEF-51D4-426E-A9C7-1696B9E9BBF0}" type="datetime1">
               <a:rPr lang="it-IT" smtClean="0"/>
-              <a:t>16/12/2017</a:t>
+              <a:t>20/12/2017</a:t>
             </a:fld>
             <a:endParaRPr lang="it-IT" dirty="0"/>
           </a:p>
@@ -20429,7 +20429,7 @@
             <a:pPr rtl="0"/>
             <a:fld id="{8EFD2C93-456F-4A6A-9C17-EC5243B30823}" type="datetime1">
               <a:rPr lang="it-IT" smtClean="0"/>
-              <a:t>16/12/2017</a:t>
+              <a:t>20/12/2017</a:t>
             </a:fld>
             <a:endParaRPr lang="it-IT" dirty="0"/>
           </a:p>
@@ -22524,8 +22524,8 @@
           </a:prstGeom>
         </p:spPr>
       </p:pic>
-      <mc:AlternateContent xmlns:mc="http://schemas.openxmlformats.org/markup-compatibility/2006">
-        <mc:Choice xmlns:a14="http://schemas.microsoft.com/office/drawing/2010/main" Requires="a14">
+      <mc:AlternateContent xmlns:mc="http://schemas.openxmlformats.org/markup-compatibility/2006" xmlns:a14="http://schemas.microsoft.com/office/drawing/2010/main">
+        <mc:Choice Requires="a14">
           <p:sp>
             <p:nvSpPr>
               <p:cNvPr id="9" name="CasellaDiTesto 8">
@@ -22612,7 +22612,7 @@
                         <a:solidFill>
                           <a:schemeClr val="accent1"/>
                         </a:solidFill>
-                        <a:latin typeface="+mj-lt"/>
+                        <a:latin typeface="Cambria Math" panose="02040503050406030204" pitchFamily="18" charset="0"/>
                       </a:rPr>
                       <m:t>𝑶</m:t>
                     </m:r>
@@ -22621,7 +22621,7 @@
                         <a:solidFill>
                           <a:schemeClr val="accent1"/>
                         </a:solidFill>
-                        <a:latin typeface="+mj-lt"/>
+                        <a:latin typeface="Cambria Math" panose="02040503050406030204" pitchFamily="18" charset="0"/>
                       </a:rPr>
                       <m:t>(</m:t>
                     </m:r>
@@ -22632,7 +22632,7 @@
                             <a:solidFill>
                               <a:schemeClr val="accent1"/>
                             </a:solidFill>
-                            <a:latin typeface="+mj-lt"/>
+                            <a:latin typeface="Cambria Math" panose="02040503050406030204" pitchFamily="18" charset="0"/>
                           </a:rPr>
                         </m:ctrlPr>
                       </m:sSupPr>
@@ -22642,7 +22642,7 @@
                             <a:solidFill>
                               <a:schemeClr val="accent1"/>
                             </a:solidFill>
-                            <a:latin typeface="+mj-lt"/>
+                            <a:latin typeface="Cambria Math" panose="02040503050406030204" pitchFamily="18" charset="0"/>
                           </a:rPr>
                           <m:t>𝑵</m:t>
                         </m:r>
@@ -22653,7 +22653,7 @@
                             <a:solidFill>
                               <a:schemeClr val="accent1"/>
                             </a:solidFill>
-                            <a:latin typeface="+mj-lt"/>
+                            <a:latin typeface="Cambria Math" panose="02040503050406030204" pitchFamily="18" charset="0"/>
                           </a:rPr>
                           <m:t>𝟐</m:t>
                         </m:r>
@@ -22664,7 +22664,7 @@
                         <a:solidFill>
                           <a:schemeClr val="accent1"/>
                         </a:solidFill>
-                        <a:latin typeface="+mj-lt"/>
+                        <a:latin typeface="Cambria Math" panose="02040503050406030204" pitchFamily="18" charset="0"/>
                       </a:rPr>
                       <m:t>𝑻</m:t>
                     </m:r>
@@ -22673,7 +22673,7 @@
                         <a:solidFill>
                           <a:schemeClr val="accent1"/>
                         </a:solidFill>
-                        <a:latin typeface="+mj-lt"/>
+                        <a:latin typeface="Cambria Math" panose="02040503050406030204" pitchFamily="18" charset="0"/>
                       </a:rPr>
                       <m:t>)</m:t>
                     </m:r>
@@ -22707,7 +22707,7 @@
             </p:txBody>
           </p:sp>
         </mc:Choice>
-        <mc:Fallback>
+        <mc:Fallback xmlns="">
           <p:sp>
             <p:nvSpPr>
               <p:cNvPr id="9" name="CasellaDiTesto 8">
@@ -26830,6 +26830,132 @@
       </p:grpSpPr>
       <p:sp>
         <p:nvSpPr>
+          <p:cNvPr id="2" name="Titolo 1"/>
+          <p:cNvSpPr>
+            <a:spLocks noGrp="1"/>
+          </p:cNvSpPr>
+          <p:nvPr>
+            <p:ph type="title"/>
+          </p:nvPr>
+        </p:nvSpPr>
+        <p:spPr>
+          <a:xfrm>
+            <a:off x="1631504" y="-963488"/>
+            <a:ext cx="7772400" cy="3177380"/>
+          </a:xfrm>
+        </p:spPr>
+        <p:txBody>
+          <a:bodyPr rtlCol="0"/>
+          <a:lstStyle/>
+          <a:p>
+            <a:pPr rtl="0"/>
+            <a:r>
+              <a:rPr lang="it-IT" dirty="0"/>
+              <a:t>PART I:</a:t>
+            </a:r>
+            <a:br>
+              <a:rPr lang="it-IT" dirty="0"/>
+            </a:br>
+            <a:r>
+              <a:rPr lang="it-IT" sz="4400" dirty="0"/>
+              <a:t>Single </a:t>
+            </a:r>
+            <a:r>
+              <a:rPr lang="it-IT" sz="4400" dirty="0" err="1"/>
+              <a:t>Chord</a:t>
+            </a:r>
+            <a:r>
+              <a:rPr lang="it-IT" sz="4400" dirty="0"/>
+              <a:t> </a:t>
+            </a:r>
+            <a:r>
+              <a:rPr lang="it-IT" sz="4400" dirty="0" err="1"/>
+              <a:t>Recognition</a:t>
+            </a:r>
+            <a:endParaRPr lang="it-IT" dirty="0"/>
+          </a:p>
+        </p:txBody>
+      </p:sp>
+      <p:pic>
+        <p:nvPicPr>
+          <p:cNvPr id="4" name="Immagine 3">
+            <a:extLst>
+              <a:ext uri="{FF2B5EF4-FFF2-40B4-BE49-F238E27FC236}">
+                <a16:creationId xmlns:a16="http://schemas.microsoft.com/office/drawing/2014/main" id="{856F0334-89F0-4239-8ECD-369C3F00E2D9}"/>
+              </a:ext>
+            </a:extLst>
+          </p:cNvPr>
+          <p:cNvPicPr>
+            <a:picLocks noChangeAspect="1"/>
+          </p:cNvPicPr>
+          <p:nvPr/>
+        </p:nvPicPr>
+        <p:blipFill>
+          <a:blip r:embed="rId3">
+            <a:extLst>
+              <a:ext uri="{28A0092B-C50C-407E-A947-70E740481C1C}">
+                <a14:useLocalDpi xmlns:a14="http://schemas.microsoft.com/office/drawing/2010/main" val="0"/>
+              </a:ext>
+            </a:extLst>
+          </a:blip>
+          <a:stretch>
+            <a:fillRect/>
+          </a:stretch>
+        </p:blipFill>
+        <p:spPr>
+          <a:xfrm>
+            <a:off x="3647728" y="2564904"/>
+            <a:ext cx="5347168" cy="3571741"/>
+          </a:xfrm>
+          <a:prstGeom prst="rect">
+            <a:avLst/>
+          </a:prstGeom>
+        </p:spPr>
+      </p:pic>
+    </p:spTree>
+    <p:extLst>
+      <p:ext uri="{BB962C8B-B14F-4D97-AF65-F5344CB8AC3E}">
+        <p14:creationId xmlns:p14="http://schemas.microsoft.com/office/powerpoint/2010/main" val="3537718460"/>
+      </p:ext>
+    </p:extLst>
+  </p:cSld>
+  <p:clrMapOvr>
+    <a:masterClrMapping/>
+  </p:clrMapOvr>
+  <mc:AlternateContent xmlns:mc="http://schemas.openxmlformats.org/markup-compatibility/2006" xmlns:p14="http://schemas.microsoft.com/office/powerpoint/2010/main">
+    <mc:Choice Requires="p14">
+      <p:transition spd="med" p14:dur="700">
+        <p:fade/>
+      </p:transition>
+    </mc:Choice>
+    <mc:Fallback xmlns="">
+      <p:transition spd="med">
+        <p:fade/>
+      </p:transition>
+    </mc:Fallback>
+  </mc:AlternateContent>
+</p:sld>
+</file>
+
+<file path=ppt/slides/slide7.xml><?xml version="1.0" encoding="utf-8"?>
+<p:sld xmlns:a="http://schemas.openxmlformats.org/drawingml/2006/main" xmlns:r="http://schemas.openxmlformats.org/officeDocument/2006/relationships" xmlns:p="http://schemas.openxmlformats.org/presentationml/2006/main">
+  <p:cSld>
+    <p:spTree>
+      <p:nvGrpSpPr>
+        <p:cNvPr id="1" name=""/>
+        <p:cNvGrpSpPr/>
+        <p:nvPr/>
+      </p:nvGrpSpPr>
+      <p:grpSpPr>
+        <a:xfrm>
+          <a:off x="0" y="0"/>
+          <a:ext cx="0" cy="0"/>
+          <a:chOff x="0" y="0"/>
+          <a:chExt cx="0" cy="0"/>
+        </a:xfrm>
+      </p:grpSpPr>
+      <p:sp>
+        <p:nvSpPr>
           <p:cNvPr id="2" name="Title 1">
             <a:extLst>
               <a:ext uri="{FF2B5EF4-FFF2-40B4-BE49-F238E27FC236}">
@@ -27049,7 +27175,7 @@
 </p:sld>
 </file>
 
-<file path=ppt/slides/slide7.xml><?xml version="1.0" encoding="utf-8"?>
+<file path=ppt/slides/slide8.xml><?xml version="1.0" encoding="utf-8"?>
 <p:sld xmlns:a="http://schemas.openxmlformats.org/drawingml/2006/main" xmlns:r="http://schemas.openxmlformats.org/officeDocument/2006/relationships" xmlns:p="http://schemas.openxmlformats.org/presentationml/2006/main">
   <p:cSld>
     <p:spTree>
@@ -27151,14 +27277,26 @@
           <a:lstStyle/>
           <a:p>
             <a:r>
-              <a:rPr lang="es-ES" dirty="0"/>
+              <a:rPr lang="es-ES" b="1" dirty="0">
+                <a:solidFill>
+                  <a:schemeClr val="accent1"/>
+                </a:solidFill>
+              </a:rPr>
               <a:t>C-</a:t>
             </a:r>
             <a:r>
-              <a:rPr lang="es-ES" dirty="0" err="1"/>
+              <a:rPr lang="es-ES" b="1" dirty="0" err="1">
+                <a:solidFill>
+                  <a:schemeClr val="accent1"/>
+                </a:solidFill>
+              </a:rPr>
               <a:t>Minor</a:t>
             </a:r>
-            <a:endParaRPr lang="es-ES" dirty="0"/>
+            <a:endParaRPr lang="es-ES" b="1" dirty="0">
+              <a:solidFill>
+                <a:schemeClr val="accent1"/>
+              </a:solidFill>
+            </a:endParaRPr>
           </a:p>
         </p:txBody>
       </p:sp>
@@ -27191,14 +27329,26 @@
           <a:lstStyle/>
           <a:p>
             <a:r>
-              <a:rPr lang="es-ES" dirty="0"/>
+              <a:rPr lang="es-ES" b="1" dirty="0">
+                <a:solidFill>
+                  <a:schemeClr val="accent1"/>
+                </a:solidFill>
+              </a:rPr>
               <a:t>C-</a:t>
             </a:r>
             <a:r>
-              <a:rPr lang="es-ES" dirty="0" err="1"/>
+              <a:rPr lang="es-ES" b="1" dirty="0" err="1">
+                <a:solidFill>
+                  <a:schemeClr val="accent1"/>
+                </a:solidFill>
+              </a:rPr>
               <a:t>Major</a:t>
             </a:r>
-            <a:endParaRPr lang="es-ES" dirty="0"/>
+            <a:endParaRPr lang="es-ES" b="1" dirty="0">
+              <a:solidFill>
+                <a:schemeClr val="accent1"/>
+              </a:solidFill>
+            </a:endParaRPr>
           </a:p>
         </p:txBody>
       </p:sp>
@@ -27429,132 +27579,6 @@
 </p:sld>
 </file>
 
-<file path=ppt/slides/slide8.xml><?xml version="1.0" encoding="utf-8"?>
-<p:sld xmlns:a="http://schemas.openxmlformats.org/drawingml/2006/main" xmlns:r="http://schemas.openxmlformats.org/officeDocument/2006/relationships" xmlns:p="http://schemas.openxmlformats.org/presentationml/2006/main">
-  <p:cSld>
-    <p:spTree>
-      <p:nvGrpSpPr>
-        <p:cNvPr id="1" name=""/>
-        <p:cNvGrpSpPr/>
-        <p:nvPr/>
-      </p:nvGrpSpPr>
-      <p:grpSpPr>
-        <a:xfrm>
-          <a:off x="0" y="0"/>
-          <a:ext cx="0" cy="0"/>
-          <a:chOff x="0" y="0"/>
-          <a:chExt cx="0" cy="0"/>
-        </a:xfrm>
-      </p:grpSpPr>
-      <p:sp>
-        <p:nvSpPr>
-          <p:cNvPr id="2" name="Titolo 1"/>
-          <p:cNvSpPr>
-            <a:spLocks noGrp="1"/>
-          </p:cNvSpPr>
-          <p:nvPr>
-            <p:ph type="title"/>
-          </p:nvPr>
-        </p:nvSpPr>
-        <p:spPr>
-          <a:xfrm>
-            <a:off x="1631504" y="-963488"/>
-            <a:ext cx="7772400" cy="3177380"/>
-          </a:xfrm>
-        </p:spPr>
-        <p:txBody>
-          <a:bodyPr rtlCol="0"/>
-          <a:lstStyle/>
-          <a:p>
-            <a:pPr rtl="0"/>
-            <a:r>
-              <a:rPr lang="it-IT" dirty="0"/>
-              <a:t>PART I:</a:t>
-            </a:r>
-            <a:br>
-              <a:rPr lang="it-IT" dirty="0"/>
-            </a:br>
-            <a:r>
-              <a:rPr lang="it-IT" sz="4400" dirty="0"/>
-              <a:t>Single </a:t>
-            </a:r>
-            <a:r>
-              <a:rPr lang="it-IT" sz="4400" dirty="0" err="1"/>
-              <a:t>Chord</a:t>
-            </a:r>
-            <a:r>
-              <a:rPr lang="it-IT" sz="4400" dirty="0"/>
-              <a:t> </a:t>
-            </a:r>
-            <a:r>
-              <a:rPr lang="it-IT" sz="4400" dirty="0" err="1"/>
-              <a:t>Recognition</a:t>
-            </a:r>
-            <a:endParaRPr lang="it-IT" dirty="0"/>
-          </a:p>
-        </p:txBody>
-      </p:sp>
-      <p:pic>
-        <p:nvPicPr>
-          <p:cNvPr id="4" name="Immagine 3">
-            <a:extLst>
-              <a:ext uri="{FF2B5EF4-FFF2-40B4-BE49-F238E27FC236}">
-                <a16:creationId xmlns:a16="http://schemas.microsoft.com/office/drawing/2014/main" id="{856F0334-89F0-4239-8ECD-369C3F00E2D9}"/>
-              </a:ext>
-            </a:extLst>
-          </p:cNvPr>
-          <p:cNvPicPr>
-            <a:picLocks noChangeAspect="1"/>
-          </p:cNvPicPr>
-          <p:nvPr/>
-        </p:nvPicPr>
-        <p:blipFill>
-          <a:blip r:embed="rId3">
-            <a:extLst>
-              <a:ext uri="{28A0092B-C50C-407E-A947-70E740481C1C}">
-                <a14:useLocalDpi xmlns:a14="http://schemas.microsoft.com/office/drawing/2010/main" val="0"/>
-              </a:ext>
-            </a:extLst>
-          </a:blip>
-          <a:stretch>
-            <a:fillRect/>
-          </a:stretch>
-        </p:blipFill>
-        <p:spPr>
-          <a:xfrm>
-            <a:off x="3647728" y="2564904"/>
-            <a:ext cx="5347168" cy="3571741"/>
-          </a:xfrm>
-          <a:prstGeom prst="rect">
-            <a:avLst/>
-          </a:prstGeom>
-        </p:spPr>
-      </p:pic>
-    </p:spTree>
-    <p:extLst>
-      <p:ext uri="{BB962C8B-B14F-4D97-AF65-F5344CB8AC3E}">
-        <p14:creationId xmlns:p14="http://schemas.microsoft.com/office/powerpoint/2010/main" val="3537718460"/>
-      </p:ext>
-    </p:extLst>
-  </p:cSld>
-  <p:clrMapOvr>
-    <a:masterClrMapping/>
-  </p:clrMapOvr>
-  <mc:AlternateContent xmlns:mc="http://schemas.openxmlformats.org/markup-compatibility/2006" xmlns:p14="http://schemas.microsoft.com/office/powerpoint/2010/main">
-    <mc:Choice Requires="p14">
-      <p:transition spd="med" p14:dur="700">
-        <p:fade/>
-      </p:transition>
-    </mc:Choice>
-    <mc:Fallback xmlns="">
-      <p:transition spd="med">
-        <p:fade/>
-      </p:transition>
-    </mc:Fallback>
-  </mc:AlternateContent>
-</p:sld>
-</file>
-
 <file path=ppt/slides/slide9.xml><?xml version="1.0" encoding="utf-8"?>
 <p:sld xmlns:a="http://schemas.openxmlformats.org/drawingml/2006/main" xmlns:r="http://schemas.openxmlformats.org/officeDocument/2006/relationships" xmlns:p="http://schemas.openxmlformats.org/presentationml/2006/main">
   <p:cSld>
@@ -27633,8 +27657,8 @@
           </a:p>
         </p:txBody>
       </p:sp>
-      <mc:AlternateContent xmlns:mc="http://schemas.openxmlformats.org/markup-compatibility/2006">
-        <mc:Choice xmlns:a14="http://schemas.microsoft.com/office/drawing/2010/main" Requires="a14">
+      <mc:AlternateContent xmlns:mc="http://schemas.openxmlformats.org/markup-compatibility/2006" xmlns:a14="http://schemas.microsoft.com/office/drawing/2010/main">
+        <mc:Choice Requires="a14">
           <p:sp>
             <p:nvSpPr>
               <p:cNvPr id="6" name="Segnaposto contenuto 5">
@@ -28036,7 +28060,7 @@
             </p:txBody>
           </p:sp>
         </mc:Choice>
-        <mc:Fallback>
+        <mc:Fallback xmlns="">
           <p:sp>
             <p:nvSpPr>
               <p:cNvPr id="6" name="Segnaposto contenuto 5">

</xml_diff>

<commit_message>
Added 2nd experiment results in slides
</commit_message>
<xml_diff>
--- a/Final Presentation/finalpresentation.pptx
+++ b/Final Presentation/finalpresentation.pptx
@@ -24979,12 +24979,6 @@
             <a:pPr marL="0" indent="0">
               <a:buNone/>
             </a:pPr>
-            <a:endParaRPr lang="it-IT" dirty="0"/>
-          </a:p>
-          <a:p>
-            <a:pPr marL="0" indent="0">
-              <a:buNone/>
-            </a:pPr>
             <a:r>
               <a:rPr lang="it-IT" dirty="0" err="1"/>
               <a:t>It</a:t>
@@ -24995,7 +24989,7 @@
             </a:r>
             <a:r>
               <a:rPr lang="it-IT" dirty="0" err="1"/>
-              <a:t>doeas</a:t>
+              <a:t>does</a:t>
             </a:r>
             <a:r>
               <a:rPr lang="it-IT" dirty="0"/>
@@ -25083,6 +25077,152 @@
           </a:prstGeom>
         </p:spPr>
       </p:pic>
+      <p:pic>
+        <p:nvPicPr>
+          <p:cNvPr id="4" name="Immagine 3">
+            <a:extLst>
+              <a:ext uri="{FF2B5EF4-FFF2-40B4-BE49-F238E27FC236}">
+                <a16:creationId xmlns:a16="http://schemas.microsoft.com/office/drawing/2014/main" id="{88144F7A-8F57-4C81-8F55-CFA815CF406F}"/>
+              </a:ext>
+            </a:extLst>
+          </p:cNvPr>
+          <p:cNvPicPr>
+            <a:picLocks noChangeAspect="1"/>
+          </p:cNvPicPr>
+          <p:nvPr/>
+        </p:nvPicPr>
+        <p:blipFill>
+          <a:blip r:embed="rId3"/>
+          <a:stretch>
+            <a:fillRect/>
+          </a:stretch>
+        </p:blipFill>
+        <p:spPr>
+          <a:xfrm>
+            <a:off x="2434923" y="4752388"/>
+            <a:ext cx="2825128" cy="875479"/>
+          </a:xfrm>
+          <a:prstGeom prst="rect">
+            <a:avLst/>
+          </a:prstGeom>
+        </p:spPr>
+      </p:pic>
+      <p:pic>
+        <p:nvPicPr>
+          <p:cNvPr id="6" name="Immagine 5">
+            <a:extLst>
+              <a:ext uri="{FF2B5EF4-FFF2-40B4-BE49-F238E27FC236}">
+                <a16:creationId xmlns:a16="http://schemas.microsoft.com/office/drawing/2014/main" id="{F9F95D30-D002-42AD-93BD-C6E38F282BF0}"/>
+              </a:ext>
+            </a:extLst>
+          </p:cNvPr>
+          <p:cNvPicPr>
+            <a:picLocks noChangeAspect="1"/>
+          </p:cNvPicPr>
+          <p:nvPr/>
+        </p:nvPicPr>
+        <p:blipFill>
+          <a:blip r:embed="rId4"/>
+          <a:stretch>
+            <a:fillRect/>
+          </a:stretch>
+        </p:blipFill>
+        <p:spPr>
+          <a:xfrm>
+            <a:off x="2434923" y="5784614"/>
+            <a:ext cx="2825128" cy="875479"/>
+          </a:xfrm>
+          <a:prstGeom prst="rect">
+            <a:avLst/>
+          </a:prstGeom>
+        </p:spPr>
+      </p:pic>
+      <p:sp>
+        <p:nvSpPr>
+          <p:cNvPr id="7" name="CasellaDiTesto 6">
+            <a:extLst>
+              <a:ext uri="{FF2B5EF4-FFF2-40B4-BE49-F238E27FC236}">
+                <a16:creationId xmlns:a16="http://schemas.microsoft.com/office/drawing/2014/main" id="{EA82B6CC-1F5C-4739-B9DD-F4E605AF7E79}"/>
+              </a:ext>
+            </a:extLst>
+          </p:cNvPr>
+          <p:cNvSpPr txBox="1"/>
+          <p:nvPr/>
+        </p:nvSpPr>
+        <p:spPr>
+          <a:xfrm>
+            <a:off x="978721" y="5005461"/>
+            <a:ext cx="1410322" cy="369332"/>
+          </a:xfrm>
+          <a:prstGeom prst="rect">
+            <a:avLst/>
+          </a:prstGeom>
+          <a:noFill/>
+        </p:spPr>
+        <p:txBody>
+          <a:bodyPr wrap="none" rtlCol="0">
+            <a:spAutoFit/>
+          </a:bodyPr>
+          <a:lstStyle/>
+          <a:p>
+            <a:r>
+              <a:rPr lang="en-US" dirty="0">
+                <a:solidFill>
+                  <a:schemeClr val="accent1"/>
+                </a:solidFill>
+              </a:rPr>
+              <a:t>Before</a:t>
+            </a:r>
+            <a:r>
+              <a:rPr lang="en-US" dirty="0"/>
+              <a:t> HMM</a:t>
+            </a:r>
+          </a:p>
+        </p:txBody>
+      </p:sp>
+      <p:sp>
+        <p:nvSpPr>
+          <p:cNvPr id="8" name="CasellaDiTesto 7">
+            <a:extLst>
+              <a:ext uri="{FF2B5EF4-FFF2-40B4-BE49-F238E27FC236}">
+                <a16:creationId xmlns:a16="http://schemas.microsoft.com/office/drawing/2014/main" id="{53C9518A-29B3-4B04-83C5-0F9B8CF28B19}"/>
+              </a:ext>
+            </a:extLst>
+          </p:cNvPr>
+          <p:cNvSpPr txBox="1"/>
+          <p:nvPr/>
+        </p:nvSpPr>
+        <p:spPr>
+          <a:xfrm>
+            <a:off x="978721" y="6037687"/>
+            <a:ext cx="1243802" cy="369332"/>
+          </a:xfrm>
+          <a:prstGeom prst="rect">
+            <a:avLst/>
+          </a:prstGeom>
+          <a:noFill/>
+        </p:spPr>
+        <p:txBody>
+          <a:bodyPr wrap="none" rtlCol="0">
+            <a:spAutoFit/>
+          </a:bodyPr>
+          <a:lstStyle/>
+          <a:p>
+            <a:r>
+              <a:rPr lang="en-US" dirty="0">
+                <a:solidFill>
+                  <a:schemeClr val="accent1"/>
+                </a:solidFill>
+              </a:rPr>
+              <a:t>After</a:t>
+            </a:r>
+            <a:r>
+              <a:rPr lang="en-US" dirty="0"/>
+              <a:t> HMM</a:t>
+            </a:r>
+          </a:p>
+        </p:txBody>
+      </p:sp>
     </p:spTree>
     <p:extLst>
       <p:ext uri="{BB962C8B-B14F-4D97-AF65-F5344CB8AC3E}">

</xml_diff>